<commit_message>
set picture fill for master shape
</commit_message>
<xml_diff>
--- a/ShapeCrawler.Tests/Resource/autoshape/autoshape-case003.pptx
+++ b/ShapeCrawler.Tests/Resource/autoshape/autoshape-case003.pptx
@@ -113,7 +113,7 @@
 </file>
 
 <file path=ppt/slideLayouts/slideLayout1.xml><?xml version="1.0" encoding="utf-8"?>
-<p:sldLayout xmlns:a="http://schemas.openxmlformats.org/drawingml/2006/main" xmlns:r="http://schemas.openxmlformats.org/officeDocument/2006/relationships" xmlns:p="http://schemas.openxmlformats.org/presentationml/2006/main" type="title" preserve="1">
+<p:sldLayout xmlns:a="http://schemas.openxmlformats.org/drawingml/2006/main" xmlns:r="http://schemas.openxmlformats.org/officeDocument/2006/relationships" xmlns:p="http://schemas.openxmlformats.org/presentationml/2006/main" preserve="1" userDrawn="1">
   <p:cSld name="Title Slide">
     <p:spTree>
       <p:nvGrpSpPr>
@@ -148,7 +148,7 @@
         <p:spPr>
           <a:xfrm>
             <a:off x="1524000" y="1122363"/>
-            <a:ext cx="9144000" cy="2387600"/>
+            <a:ext cx="9144000" cy="953364"/>
           </a:xfrm>
         </p:spPr>
         <p:txBody>
@@ -169,77 +169,6 @@
       </p:sp>
       <p:sp>
         <p:nvSpPr>
-          <p:cNvPr id="3" name="Subtitle 2">
-            <a:extLst>
-              <a:ext uri="{FF2B5EF4-FFF2-40B4-BE49-F238E27FC236}">
-                <a16:creationId xmlns:a16="http://schemas.microsoft.com/office/drawing/2014/main" id="{7878408A-5808-4480-BE37-92DED09E314A}"/>
-              </a:ext>
-            </a:extLst>
-          </p:cNvPr>
-          <p:cNvSpPr>
-            <a:spLocks noGrp="1"/>
-          </p:cNvSpPr>
-          <p:nvPr>
-            <p:ph type="subTitle" idx="1"/>
-          </p:nvPr>
-        </p:nvSpPr>
-        <p:spPr>
-          <a:xfrm>
-            <a:off x="1524000" y="3602038"/>
-            <a:ext cx="9144000" cy="1655762"/>
-          </a:xfrm>
-        </p:spPr>
-        <p:txBody>
-          <a:bodyPr/>
-          <a:lstStyle>
-            <a:lvl1pPr marL="0" indent="0" algn="ctr">
-              <a:buNone/>
-              <a:defRPr sz="2400"/>
-            </a:lvl1pPr>
-            <a:lvl2pPr marL="457200" indent="0" algn="ctr">
-              <a:buNone/>
-              <a:defRPr sz="2000"/>
-            </a:lvl2pPr>
-            <a:lvl3pPr marL="914400" indent="0" algn="ctr">
-              <a:buNone/>
-              <a:defRPr sz="1800"/>
-            </a:lvl3pPr>
-            <a:lvl4pPr marL="1371600" indent="0" algn="ctr">
-              <a:buNone/>
-              <a:defRPr sz="1600"/>
-            </a:lvl4pPr>
-            <a:lvl5pPr marL="1828800" indent="0" algn="ctr">
-              <a:buNone/>
-              <a:defRPr sz="1600"/>
-            </a:lvl5pPr>
-            <a:lvl6pPr marL="2286000" indent="0" algn="ctr">
-              <a:buNone/>
-              <a:defRPr sz="1600"/>
-            </a:lvl6pPr>
-            <a:lvl7pPr marL="2743200" indent="0" algn="ctr">
-              <a:buNone/>
-              <a:defRPr sz="1600"/>
-            </a:lvl7pPr>
-            <a:lvl8pPr marL="3200400" indent="0" algn="ctr">
-              <a:buNone/>
-              <a:defRPr sz="1600"/>
-            </a:lvl8pPr>
-            <a:lvl9pPr marL="3657600" indent="0" algn="ctr">
-              <a:buNone/>
-              <a:defRPr sz="1600"/>
-            </a:lvl9pPr>
-          </a:lstStyle>
-          <a:p>
-            <a:r>
-              <a:rPr lang="en-US"/>
-              <a:t>Click to edit Master subtitle style</a:t>
-            </a:r>
-            <a:endParaRPr lang="de-DE"/>
-          </a:p>
-        </p:txBody>
-      </p:sp>
-      <p:sp>
-        <p:nvSpPr>
           <p:cNvPr id="4" name="Date Placeholder 3">
             <a:extLst>
               <a:ext uri="{FF2B5EF4-FFF2-40B4-BE49-F238E27FC236}">
@@ -261,7 +190,7 @@
           <a:p>
             <a:fld id="{187A1D98-78C0-4636-B978-80F082D40D27}" type="datetimeFigureOut">
               <a:rPr lang="de-DE" smtClean="0"/>
-              <a:t>14.09.2022</a:t>
+              <a:t>11.10.2022</a:t>
             </a:fld>
             <a:endParaRPr lang="de-DE"/>
           </a:p>
@@ -318,6 +247,56 @@
               <a:t>‹#›</a:t>
             </a:fld>
             <a:endParaRPr lang="de-DE"/>
+          </a:p>
+        </p:txBody>
+      </p:sp>
+      <p:sp>
+        <p:nvSpPr>
+          <p:cNvPr id="9" name="AutoShape 1">
+            <a:extLst>
+              <a:ext uri="{FF2B5EF4-FFF2-40B4-BE49-F238E27FC236}">
+                <a16:creationId xmlns:a16="http://schemas.microsoft.com/office/drawing/2014/main" id="{E238B131-4CA9-4683-B792-358896646F69}"/>
+              </a:ext>
+            </a:extLst>
+          </p:cNvPr>
+          <p:cNvSpPr/>
+          <p:nvPr userDrawn="1"/>
+        </p:nvSpPr>
+        <p:spPr>
+          <a:xfrm>
+            <a:off x="1524000" y="2651760"/>
+            <a:ext cx="1750423" cy="631371"/>
+          </a:xfrm>
+          <a:prstGeom prst="rect">
+            <a:avLst/>
+          </a:prstGeom>
+        </p:spPr>
+        <p:style>
+          <a:lnRef idx="2">
+            <a:schemeClr val="accent1">
+              <a:shade val="50000"/>
+            </a:schemeClr>
+          </a:lnRef>
+          <a:fillRef idx="1">
+            <a:schemeClr val="accent1"/>
+          </a:fillRef>
+          <a:effectRef idx="0">
+            <a:schemeClr val="accent1"/>
+          </a:effectRef>
+          <a:fontRef idx="minor">
+            <a:schemeClr val="lt1"/>
+          </a:fontRef>
+        </p:style>
+        <p:txBody>
+          <a:bodyPr rtlCol="0" anchor="ctr"/>
+          <a:lstStyle/>
+          <a:p>
+            <a:pPr algn="ctr"/>
+            <a:r>
+              <a:rPr lang="en-US" dirty="0"/>
+              <a:t>AutoShape 1</a:t>
+            </a:r>
+            <a:endParaRPr lang="de-DE" dirty="0"/>
           </a:p>
         </p:txBody>
       </p:sp>
@@ -396,7 +375,15 @@
             <p:ph type="body" orient="vert" idx="1"/>
           </p:nvPr>
         </p:nvSpPr>
-        <p:spPr/>
+        <p:spPr>
+          <a:xfrm>
+            <a:off x="838200" y="1825625"/>
+            <a:ext cx="10515600" cy="4351338"/>
+          </a:xfrm>
+          <a:prstGeom prst="rect">
+            <a:avLst/>
+          </a:prstGeom>
+        </p:spPr>
         <p:txBody>
           <a:bodyPr vert="eaVert"/>
           <a:lstStyle/>
@@ -461,7 +448,7 @@
           <a:p>
             <a:fld id="{187A1D98-78C0-4636-B978-80F082D40D27}" type="datetimeFigureOut">
               <a:rPr lang="de-DE" smtClean="0"/>
-              <a:t>14.09.2022</a:t>
+              <a:t>11.10.2022</a:t>
             </a:fld>
             <a:endParaRPr lang="de-DE"/>
           </a:p>
@@ -606,6 +593,9 @@
             <a:off x="838200" y="365125"/>
             <a:ext cx="7734300" cy="5811838"/>
           </a:xfrm>
+          <a:prstGeom prst="rect">
+            <a:avLst/>
+          </a:prstGeom>
         </p:spPr>
         <p:txBody>
           <a:bodyPr vert="eaVert"/>
@@ -671,7 +661,7 @@
           <a:p>
             <a:fld id="{187A1D98-78C0-4636-B978-80F082D40D27}" type="datetimeFigureOut">
               <a:rPr lang="de-DE" smtClean="0"/>
-              <a:t>14.09.2022</a:t>
+              <a:t>11.10.2022</a:t>
             </a:fld>
             <a:endParaRPr lang="de-DE"/>
           </a:p>
@@ -806,7 +796,15 @@
             <p:ph idx="1"/>
           </p:nvPr>
         </p:nvSpPr>
-        <p:spPr/>
+        <p:spPr>
+          <a:xfrm>
+            <a:off x="838200" y="1825625"/>
+            <a:ext cx="10515600" cy="4351338"/>
+          </a:xfrm>
+          <a:prstGeom prst="rect">
+            <a:avLst/>
+          </a:prstGeom>
+        </p:spPr>
         <p:txBody>
           <a:bodyPr/>
           <a:lstStyle/>
@@ -871,7 +869,7 @@
           <a:p>
             <a:fld id="{187A1D98-78C0-4636-B978-80F082D40D27}" type="datetimeFigureOut">
               <a:rPr lang="de-DE" smtClean="0"/>
-              <a:t>14.09.2022</a:t>
+              <a:t>11.10.2022</a:t>
             </a:fld>
             <a:endParaRPr lang="de-DE"/>
           </a:p>
@@ -1020,6 +1018,9 @@
             <a:off x="831850" y="4589463"/>
             <a:ext cx="10515600" cy="1500187"/>
           </a:xfrm>
+          <a:prstGeom prst="rect">
+            <a:avLst/>
+          </a:prstGeom>
         </p:spPr>
         <p:txBody>
           <a:bodyPr/>
@@ -1147,7 +1148,7 @@
           <a:p>
             <a:fld id="{187A1D98-78C0-4636-B978-80F082D40D27}" type="datetimeFigureOut">
               <a:rPr lang="de-DE" smtClean="0"/>
-              <a:t>14.09.2022</a:t>
+              <a:t>11.10.2022</a:t>
             </a:fld>
             <a:endParaRPr lang="de-DE"/>
           </a:p>
@@ -1287,6 +1288,9 @@
             <a:off x="838200" y="1825625"/>
             <a:ext cx="5181600" cy="4351338"/>
           </a:xfrm>
+          <a:prstGeom prst="rect">
+            <a:avLst/>
+          </a:prstGeom>
         </p:spPr>
         <p:txBody>
           <a:bodyPr/>
@@ -1350,6 +1354,9 @@
             <a:off x="6172200" y="1825625"/>
             <a:ext cx="5181600" cy="4351338"/>
           </a:xfrm>
+          <a:prstGeom prst="rect">
+            <a:avLst/>
+          </a:prstGeom>
         </p:spPr>
         <p:txBody>
           <a:bodyPr/>
@@ -1415,7 +1422,7 @@
           <a:p>
             <a:fld id="{187A1D98-78C0-4636-B978-80F082D40D27}" type="datetimeFigureOut">
               <a:rPr lang="de-DE" smtClean="0"/>
-              <a:t>14.09.2022</a:t>
+              <a:t>11.10.2022</a:t>
             </a:fld>
             <a:endParaRPr lang="de-DE"/>
           </a:p>
@@ -1560,6 +1567,9 @@
             <a:off x="839788" y="1681163"/>
             <a:ext cx="5157787" cy="823912"/>
           </a:xfrm>
+          <a:prstGeom prst="rect">
+            <a:avLst/>
+          </a:prstGeom>
         </p:spPr>
         <p:txBody>
           <a:bodyPr anchor="b"/>
@@ -1631,6 +1641,9 @@
             <a:off x="839788" y="2505075"/>
             <a:ext cx="5157787" cy="3684588"/>
           </a:xfrm>
+          <a:prstGeom prst="rect">
+            <a:avLst/>
+          </a:prstGeom>
         </p:spPr>
         <p:txBody>
           <a:bodyPr/>
@@ -1694,6 +1707,9 @@
             <a:off x="6172200" y="1681163"/>
             <a:ext cx="5183188" cy="823912"/>
           </a:xfrm>
+          <a:prstGeom prst="rect">
+            <a:avLst/>
+          </a:prstGeom>
         </p:spPr>
         <p:txBody>
           <a:bodyPr anchor="b"/>
@@ -1765,6 +1781,9 @@
             <a:off x="6172200" y="2505075"/>
             <a:ext cx="5183188" cy="3684588"/>
           </a:xfrm>
+          <a:prstGeom prst="rect">
+            <a:avLst/>
+          </a:prstGeom>
         </p:spPr>
         <p:txBody>
           <a:bodyPr/>
@@ -1830,7 +1849,7 @@
           <a:p>
             <a:fld id="{187A1D98-78C0-4636-B978-80F082D40D27}" type="datetimeFigureOut">
               <a:rPr lang="de-DE" smtClean="0"/>
-              <a:t>14.09.2022</a:t>
+              <a:t>11.10.2022</a:t>
             </a:fld>
             <a:endParaRPr lang="de-DE"/>
           </a:p>
@@ -1972,7 +1991,7 @@
           <a:p>
             <a:fld id="{187A1D98-78C0-4636-B978-80F082D40D27}" type="datetimeFigureOut">
               <a:rPr lang="de-DE" smtClean="0"/>
-              <a:t>14.09.2022</a:t>
+              <a:t>11.10.2022</a:t>
             </a:fld>
             <a:endParaRPr lang="de-DE"/>
           </a:p>
@@ -2085,7 +2104,7 @@
           <a:p>
             <a:fld id="{187A1D98-78C0-4636-B978-80F082D40D27}" type="datetimeFigureOut">
               <a:rPr lang="de-DE" smtClean="0"/>
-              <a:t>14.09.2022</a:t>
+              <a:t>11.10.2022</a:t>
             </a:fld>
             <a:endParaRPr lang="de-DE"/>
           </a:p>
@@ -2234,6 +2253,9 @@
             <a:off x="5183188" y="987425"/>
             <a:ext cx="6172200" cy="4873625"/>
           </a:xfrm>
+          <a:prstGeom prst="rect">
+            <a:avLst/>
+          </a:prstGeom>
         </p:spPr>
         <p:txBody>
           <a:bodyPr/>
@@ -2325,6 +2347,9 @@
             <a:off x="839788" y="2057400"/>
             <a:ext cx="3932237" cy="3811588"/>
           </a:xfrm>
+          <a:prstGeom prst="rect">
+            <a:avLst/>
+          </a:prstGeom>
         </p:spPr>
         <p:txBody>
           <a:bodyPr/>
@@ -2398,7 +2423,7 @@
           <a:p>
             <a:fld id="{187A1D98-78C0-4636-B978-80F082D40D27}" type="datetimeFigureOut">
               <a:rPr lang="de-DE" smtClean="0"/>
-              <a:t>14.09.2022</a:t>
+              <a:t>11.10.2022</a:t>
             </a:fld>
             <a:endParaRPr lang="de-DE"/>
           </a:p>
@@ -2547,6 +2572,9 @@
             <a:off x="5183188" y="987425"/>
             <a:ext cx="6172200" cy="4873625"/>
           </a:xfrm>
+          <a:prstGeom prst="rect">
+            <a:avLst/>
+          </a:prstGeom>
         </p:spPr>
         <p:txBody>
           <a:bodyPr/>
@@ -2614,6 +2642,9 @@
             <a:off x="839788" y="2057400"/>
             <a:ext cx="3932237" cy="3811588"/>
           </a:xfrm>
+          <a:prstGeom prst="rect">
+            <a:avLst/>
+          </a:prstGeom>
         </p:spPr>
         <p:txBody>
           <a:bodyPr/>
@@ -2687,7 +2718,7 @@
           <a:p>
             <a:fld id="{187A1D98-78C0-4636-B978-80F082D40D27}" type="datetimeFigureOut">
               <a:rPr lang="de-DE" smtClean="0"/>
-              <a:t>14.09.2022</a:t>
+              <a:t>11.10.2022</a:t>
             </a:fld>
             <a:endParaRPr lang="de-DE"/>
           </a:p>
@@ -2823,74 +2854,6 @@
       </p:sp>
       <p:sp>
         <p:nvSpPr>
-          <p:cNvPr id="3" name="Text Placeholder 2">
-            <a:extLst>
-              <a:ext uri="{FF2B5EF4-FFF2-40B4-BE49-F238E27FC236}">
-                <a16:creationId xmlns:a16="http://schemas.microsoft.com/office/drawing/2014/main" id="{7DF90048-638F-4999-8905-529031C7AF1A}"/>
-              </a:ext>
-            </a:extLst>
-          </p:cNvPr>
-          <p:cNvSpPr>
-            <a:spLocks noGrp="1"/>
-          </p:cNvSpPr>
-          <p:nvPr>
-            <p:ph type="body" idx="1"/>
-          </p:nvPr>
-        </p:nvSpPr>
-        <p:spPr>
-          <a:xfrm>
-            <a:off x="838200" y="1825625"/>
-            <a:ext cx="10515600" cy="4351338"/>
-          </a:xfrm>
-          <a:prstGeom prst="rect">
-            <a:avLst/>
-          </a:prstGeom>
-        </p:spPr>
-        <p:txBody>
-          <a:bodyPr vert="horz" lIns="91440" tIns="45720" rIns="91440" bIns="45720" rtlCol="0">
-            <a:normAutofit/>
-          </a:bodyPr>
-          <a:lstStyle/>
-          <a:p>
-            <a:pPr lvl="0"/>
-            <a:r>
-              <a:rPr lang="en-US"/>
-              <a:t>Click to edit Master text styles</a:t>
-            </a:r>
-          </a:p>
-          <a:p>
-            <a:pPr lvl="1"/>
-            <a:r>
-              <a:rPr lang="en-US"/>
-              <a:t>Second level</a:t>
-            </a:r>
-          </a:p>
-          <a:p>
-            <a:pPr lvl="2"/>
-            <a:r>
-              <a:rPr lang="en-US"/>
-              <a:t>Third level</a:t>
-            </a:r>
-          </a:p>
-          <a:p>
-            <a:pPr lvl="3"/>
-            <a:r>
-              <a:rPr lang="en-US"/>
-              <a:t>Fourth level</a:t>
-            </a:r>
-          </a:p>
-          <a:p>
-            <a:pPr lvl="4"/>
-            <a:r>
-              <a:rPr lang="en-US"/>
-              <a:t>Fifth level</a:t>
-            </a:r>
-            <a:endParaRPr lang="de-DE"/>
-          </a:p>
-        </p:txBody>
-      </p:sp>
-      <p:sp>
-        <p:nvSpPr>
           <p:cNvPr id="4" name="Date Placeholder 3">
             <a:extLst>
               <a:ext uri="{FF2B5EF4-FFF2-40B4-BE49-F238E27FC236}">
@@ -2930,7 +2893,7 @@
           <a:p>
             <a:fld id="{187A1D98-78C0-4636-B978-80F082D40D27}" type="datetimeFigureOut">
               <a:rPr lang="de-DE" smtClean="0"/>
-              <a:t>14.09.2022</a:t>
+              <a:t>11.10.2022</a:t>
             </a:fld>
             <a:endParaRPr lang="de-DE"/>
           </a:p>
@@ -3023,6 +2986,56 @@
               <a:t>‹#›</a:t>
             </a:fld>
             <a:endParaRPr lang="de-DE"/>
+          </a:p>
+        </p:txBody>
+      </p:sp>
+      <p:sp>
+        <p:nvSpPr>
+          <p:cNvPr id="7" name="AutoShape 1">
+            <a:extLst>
+              <a:ext uri="{FF2B5EF4-FFF2-40B4-BE49-F238E27FC236}">
+                <a16:creationId xmlns:a16="http://schemas.microsoft.com/office/drawing/2014/main" id="{768160CE-6935-41EC-B4E4-031978912516}"/>
+              </a:ext>
+            </a:extLst>
+          </p:cNvPr>
+          <p:cNvSpPr/>
+          <p:nvPr userDrawn="1"/>
+        </p:nvSpPr>
+        <p:spPr>
+          <a:xfrm>
+            <a:off x="838200" y="5731098"/>
+            <a:ext cx="1296473" cy="334851"/>
+          </a:xfrm>
+          <a:prstGeom prst="rect">
+            <a:avLst/>
+          </a:prstGeom>
+        </p:spPr>
+        <p:style>
+          <a:lnRef idx="2">
+            <a:schemeClr val="accent1">
+              <a:shade val="50000"/>
+            </a:schemeClr>
+          </a:lnRef>
+          <a:fillRef idx="1">
+            <a:schemeClr val="accent1"/>
+          </a:fillRef>
+          <a:effectRef idx="0">
+            <a:schemeClr val="accent1"/>
+          </a:effectRef>
+          <a:fontRef idx="minor">
+            <a:schemeClr val="lt1"/>
+          </a:fontRef>
+        </p:style>
+        <p:txBody>
+          <a:bodyPr rtlCol="0" anchor="ctr"/>
+          <a:lstStyle/>
+          <a:p>
+            <a:pPr algn="ctr"/>
+            <a:r>
+              <a:rPr lang="en-US" sz="1600" dirty="0"/>
+              <a:t>AutoShape 1</a:t>
+            </a:r>
+            <a:endParaRPr lang="de-DE" sz="1600" dirty="0"/>
           </a:p>
         </p:txBody>
       </p:sp>

</xml_diff>

<commit_message>
add IParagraph.ReplaceText(string oldValue, string newValue)
</commit_message>
<xml_diff>
--- a/ShapeCrawler.Tests/Resource/autoshape/autoshape-case003.pptx
+++ b/ShapeCrawler.Tests/Resource/autoshape/autoshape-case003.pptx
@@ -190,7 +190,7 @@
           <a:p>
             <a:fld id="{187A1D98-78C0-4636-B978-80F082D40D27}" type="datetimeFigureOut">
               <a:rPr lang="de-DE" smtClean="0"/>
-              <a:t>11.10.2022</a:t>
+              <a:t>01.11.2022</a:t>
             </a:fld>
             <a:endParaRPr lang="de-DE"/>
           </a:p>
@@ -448,7 +448,7 @@
           <a:p>
             <a:fld id="{187A1D98-78C0-4636-B978-80F082D40D27}" type="datetimeFigureOut">
               <a:rPr lang="de-DE" smtClean="0"/>
-              <a:t>11.10.2022</a:t>
+              <a:t>01.11.2022</a:t>
             </a:fld>
             <a:endParaRPr lang="de-DE"/>
           </a:p>
@@ -661,7 +661,7 @@
           <a:p>
             <a:fld id="{187A1D98-78C0-4636-B978-80F082D40D27}" type="datetimeFigureOut">
               <a:rPr lang="de-DE" smtClean="0"/>
-              <a:t>11.10.2022</a:t>
+              <a:t>01.11.2022</a:t>
             </a:fld>
             <a:endParaRPr lang="de-DE"/>
           </a:p>
@@ -869,7 +869,7 @@
           <a:p>
             <a:fld id="{187A1D98-78C0-4636-B978-80F082D40D27}" type="datetimeFigureOut">
               <a:rPr lang="de-DE" smtClean="0"/>
-              <a:t>11.10.2022</a:t>
+              <a:t>01.11.2022</a:t>
             </a:fld>
             <a:endParaRPr lang="de-DE"/>
           </a:p>
@@ -1148,7 +1148,7 @@
           <a:p>
             <a:fld id="{187A1D98-78C0-4636-B978-80F082D40D27}" type="datetimeFigureOut">
               <a:rPr lang="de-DE" smtClean="0"/>
-              <a:t>11.10.2022</a:t>
+              <a:t>01.11.2022</a:t>
             </a:fld>
             <a:endParaRPr lang="de-DE"/>
           </a:p>
@@ -1422,7 +1422,7 @@
           <a:p>
             <a:fld id="{187A1D98-78C0-4636-B978-80F082D40D27}" type="datetimeFigureOut">
               <a:rPr lang="de-DE" smtClean="0"/>
-              <a:t>11.10.2022</a:t>
+              <a:t>01.11.2022</a:t>
             </a:fld>
             <a:endParaRPr lang="de-DE"/>
           </a:p>
@@ -1849,7 +1849,7 @@
           <a:p>
             <a:fld id="{187A1D98-78C0-4636-B978-80F082D40D27}" type="datetimeFigureOut">
               <a:rPr lang="de-DE" smtClean="0"/>
-              <a:t>11.10.2022</a:t>
+              <a:t>01.11.2022</a:t>
             </a:fld>
             <a:endParaRPr lang="de-DE"/>
           </a:p>
@@ -1991,7 +1991,7 @@
           <a:p>
             <a:fld id="{187A1D98-78C0-4636-B978-80F082D40D27}" type="datetimeFigureOut">
               <a:rPr lang="de-DE" smtClean="0"/>
-              <a:t>11.10.2022</a:t>
+              <a:t>01.11.2022</a:t>
             </a:fld>
             <a:endParaRPr lang="de-DE"/>
           </a:p>
@@ -2104,7 +2104,7 @@
           <a:p>
             <a:fld id="{187A1D98-78C0-4636-B978-80F082D40D27}" type="datetimeFigureOut">
               <a:rPr lang="de-DE" smtClean="0"/>
-              <a:t>11.10.2022</a:t>
+              <a:t>01.11.2022</a:t>
             </a:fld>
             <a:endParaRPr lang="de-DE"/>
           </a:p>
@@ -2423,7 +2423,7 @@
           <a:p>
             <a:fld id="{187A1D98-78C0-4636-B978-80F082D40D27}" type="datetimeFigureOut">
               <a:rPr lang="de-DE" smtClean="0"/>
-              <a:t>11.10.2022</a:t>
+              <a:t>01.11.2022</a:t>
             </a:fld>
             <a:endParaRPr lang="de-DE"/>
           </a:p>
@@ -2718,7 +2718,7 @@
           <a:p>
             <a:fld id="{187A1D98-78C0-4636-B978-80F082D40D27}" type="datetimeFigureOut">
               <a:rPr lang="de-DE" smtClean="0"/>
-              <a:t>11.10.2022</a:t>
+              <a:t>01.11.2022</a:t>
             </a:fld>
             <a:endParaRPr lang="de-DE"/>
           </a:p>
@@ -2893,7 +2893,7 @@
           <a:p>
             <a:fld id="{187A1D98-78C0-4636-B978-80F082D40D27}" type="datetimeFigureOut">
               <a:rPr lang="de-DE" smtClean="0"/>
-              <a:t>11.10.2022</a:t>
+              <a:t>01.11.2022</a:t>
             </a:fld>
             <a:endParaRPr lang="de-DE"/>
           </a:p>
@@ -3469,6 +3469,73 @@
           </a:p>
         </p:txBody>
       </p:sp>
+      <p:sp>
+        <p:nvSpPr>
+          <p:cNvPr id="5" name="AutoShape 3">
+            <a:extLst>
+              <a:ext uri="{FF2B5EF4-FFF2-40B4-BE49-F238E27FC236}">
+                <a16:creationId xmlns:a16="http://schemas.microsoft.com/office/drawing/2014/main" id="{3E38D920-4C86-554B-0217-17B187DC0326}"/>
+              </a:ext>
+            </a:extLst>
+          </p:cNvPr>
+          <p:cNvSpPr/>
+          <p:nvPr/>
+        </p:nvSpPr>
+        <p:spPr>
+          <a:xfrm>
+            <a:off x="2837089" y="159201"/>
+            <a:ext cx="1098096" cy="571501"/>
+          </a:xfrm>
+          <a:prstGeom prst="rect">
+            <a:avLst/>
+          </a:prstGeom>
+          <a:noFill/>
+        </p:spPr>
+        <p:style>
+          <a:lnRef idx="2">
+            <a:schemeClr val="accent1">
+              <a:shade val="50000"/>
+            </a:schemeClr>
+          </a:lnRef>
+          <a:fillRef idx="1">
+            <a:schemeClr val="accent1"/>
+          </a:fillRef>
+          <a:effectRef idx="0">
+            <a:schemeClr val="accent1"/>
+          </a:effectRef>
+          <a:fontRef idx="minor">
+            <a:schemeClr val="lt1"/>
+          </a:fontRef>
+        </p:style>
+        <p:txBody>
+          <a:bodyPr rtlCol="0" anchor="ctr"/>
+          <a:lstStyle/>
+          <a:p>
+            <a:pPr algn="ctr"/>
+            <a:r>
+              <a:rPr lang="en-US" sz="1200" dirty="0">
+                <a:solidFill>
+                  <a:schemeClr val="tx1"/>
+                </a:solidFill>
+              </a:rPr>
+              <a:t>Some</a:t>
+            </a:r>
+            <a:r>
+              <a:rPr lang="en-US" sz="1100" dirty="0">
+                <a:solidFill>
+                  <a:schemeClr val="tx1"/>
+                </a:solidFill>
+              </a:rPr>
+              <a:t> text</a:t>
+            </a:r>
+            <a:endParaRPr lang="de-DE" sz="1100" dirty="0">
+              <a:solidFill>
+                <a:schemeClr val="tx1"/>
+              </a:solidFill>
+            </a:endParaRPr>
+          </a:p>
+        </p:txBody>
+      </p:sp>
     </p:spTree>
     <p:extLst>
       <p:ext uri="{BB962C8B-B14F-4D97-AF65-F5344CB8AC3E}">

</xml_diff>

<commit_message>
get left and right margins
</commit_message>
<xml_diff>
--- a/ShapeCrawler.Tests/Resource/autoshape/autoshape-case003.pptx
+++ b/ShapeCrawler.Tests/Resource/autoshape/autoshape-case003.pptx
@@ -190,7 +190,7 @@
           <a:p>
             <a:fld id="{187A1D98-78C0-4636-B978-80F082D40D27}" type="datetimeFigureOut">
               <a:rPr lang="de-DE" smtClean="0"/>
-              <a:t>01.11.2022</a:t>
+              <a:t>05.11.2022</a:t>
             </a:fld>
             <a:endParaRPr lang="de-DE"/>
           </a:p>
@@ -448,7 +448,7 @@
           <a:p>
             <a:fld id="{187A1D98-78C0-4636-B978-80F082D40D27}" type="datetimeFigureOut">
               <a:rPr lang="de-DE" smtClean="0"/>
-              <a:t>01.11.2022</a:t>
+              <a:t>05.11.2022</a:t>
             </a:fld>
             <a:endParaRPr lang="de-DE"/>
           </a:p>
@@ -661,7 +661,7 @@
           <a:p>
             <a:fld id="{187A1D98-78C0-4636-B978-80F082D40D27}" type="datetimeFigureOut">
               <a:rPr lang="de-DE" smtClean="0"/>
-              <a:t>01.11.2022</a:t>
+              <a:t>05.11.2022</a:t>
             </a:fld>
             <a:endParaRPr lang="de-DE"/>
           </a:p>
@@ -869,7 +869,7 @@
           <a:p>
             <a:fld id="{187A1D98-78C0-4636-B978-80F082D40D27}" type="datetimeFigureOut">
               <a:rPr lang="de-DE" smtClean="0"/>
-              <a:t>01.11.2022</a:t>
+              <a:t>05.11.2022</a:t>
             </a:fld>
             <a:endParaRPr lang="de-DE"/>
           </a:p>
@@ -1148,7 +1148,7 @@
           <a:p>
             <a:fld id="{187A1D98-78C0-4636-B978-80F082D40D27}" type="datetimeFigureOut">
               <a:rPr lang="de-DE" smtClean="0"/>
-              <a:t>01.11.2022</a:t>
+              <a:t>05.11.2022</a:t>
             </a:fld>
             <a:endParaRPr lang="de-DE"/>
           </a:p>
@@ -1422,7 +1422,7 @@
           <a:p>
             <a:fld id="{187A1D98-78C0-4636-B978-80F082D40D27}" type="datetimeFigureOut">
               <a:rPr lang="de-DE" smtClean="0"/>
-              <a:t>01.11.2022</a:t>
+              <a:t>05.11.2022</a:t>
             </a:fld>
             <a:endParaRPr lang="de-DE"/>
           </a:p>
@@ -1849,7 +1849,7 @@
           <a:p>
             <a:fld id="{187A1D98-78C0-4636-B978-80F082D40D27}" type="datetimeFigureOut">
               <a:rPr lang="de-DE" smtClean="0"/>
-              <a:t>01.11.2022</a:t>
+              <a:t>05.11.2022</a:t>
             </a:fld>
             <a:endParaRPr lang="de-DE"/>
           </a:p>
@@ -1991,7 +1991,7 @@
           <a:p>
             <a:fld id="{187A1D98-78C0-4636-B978-80F082D40D27}" type="datetimeFigureOut">
               <a:rPr lang="de-DE" smtClean="0"/>
-              <a:t>01.11.2022</a:t>
+              <a:t>05.11.2022</a:t>
             </a:fld>
             <a:endParaRPr lang="de-DE"/>
           </a:p>
@@ -2104,7 +2104,7 @@
           <a:p>
             <a:fld id="{187A1D98-78C0-4636-B978-80F082D40D27}" type="datetimeFigureOut">
               <a:rPr lang="de-DE" smtClean="0"/>
-              <a:t>01.11.2022</a:t>
+              <a:t>05.11.2022</a:t>
             </a:fld>
             <a:endParaRPr lang="de-DE"/>
           </a:p>
@@ -2423,7 +2423,7 @@
           <a:p>
             <a:fld id="{187A1D98-78C0-4636-B978-80F082D40D27}" type="datetimeFigureOut">
               <a:rPr lang="de-DE" smtClean="0"/>
-              <a:t>01.11.2022</a:t>
+              <a:t>05.11.2022</a:t>
             </a:fld>
             <a:endParaRPr lang="de-DE"/>
           </a:p>
@@ -2718,7 +2718,7 @@
           <a:p>
             <a:fld id="{187A1D98-78C0-4636-B978-80F082D40D27}" type="datetimeFigureOut">
               <a:rPr lang="de-DE" smtClean="0"/>
-              <a:t>01.11.2022</a:t>
+              <a:t>05.11.2022</a:t>
             </a:fld>
             <a:endParaRPr lang="de-DE"/>
           </a:p>
@@ -2893,7 +2893,7 @@
           <a:p>
             <a:fld id="{187A1D98-78C0-4636-B978-80F082D40D27}" type="datetimeFigureOut">
               <a:rPr lang="de-DE" smtClean="0"/>
-              <a:t>01.11.2022</a:t>
+              <a:t>05.11.2022</a:t>
             </a:fld>
             <a:endParaRPr lang="de-DE"/>
           </a:p>
@@ -3508,7 +3508,7 @@
           </a:fontRef>
         </p:style>
         <p:txBody>
-          <a:bodyPr rtlCol="0" anchor="ctr"/>
+          <a:bodyPr lIns="108000" rtlCol="0" anchor="ctr"/>
           <a:lstStyle/>
           <a:p>
             <a:pPr algn="ctr"/>

</xml_diff>

<commit_message>
get top and bottom margins
</commit_message>
<xml_diff>
--- a/ShapeCrawler.Tests/Resource/autoshape/autoshape-case003.pptx
+++ b/ShapeCrawler.Tests/Resource/autoshape/autoshape-case003.pptx
@@ -190,7 +190,7 @@
           <a:p>
             <a:fld id="{187A1D98-78C0-4636-B978-80F082D40D27}" type="datetimeFigureOut">
               <a:rPr lang="de-DE" smtClean="0"/>
-              <a:t>05.11.2022</a:t>
+              <a:t>06.11.2022</a:t>
             </a:fld>
             <a:endParaRPr lang="de-DE"/>
           </a:p>
@@ -448,7 +448,7 @@
           <a:p>
             <a:fld id="{187A1D98-78C0-4636-B978-80F082D40D27}" type="datetimeFigureOut">
               <a:rPr lang="de-DE" smtClean="0"/>
-              <a:t>05.11.2022</a:t>
+              <a:t>06.11.2022</a:t>
             </a:fld>
             <a:endParaRPr lang="de-DE"/>
           </a:p>
@@ -661,7 +661,7 @@
           <a:p>
             <a:fld id="{187A1D98-78C0-4636-B978-80F082D40D27}" type="datetimeFigureOut">
               <a:rPr lang="de-DE" smtClean="0"/>
-              <a:t>05.11.2022</a:t>
+              <a:t>06.11.2022</a:t>
             </a:fld>
             <a:endParaRPr lang="de-DE"/>
           </a:p>
@@ -869,7 +869,7 @@
           <a:p>
             <a:fld id="{187A1D98-78C0-4636-B978-80F082D40D27}" type="datetimeFigureOut">
               <a:rPr lang="de-DE" smtClean="0"/>
-              <a:t>05.11.2022</a:t>
+              <a:t>06.11.2022</a:t>
             </a:fld>
             <a:endParaRPr lang="de-DE"/>
           </a:p>
@@ -1148,7 +1148,7 @@
           <a:p>
             <a:fld id="{187A1D98-78C0-4636-B978-80F082D40D27}" type="datetimeFigureOut">
               <a:rPr lang="de-DE" smtClean="0"/>
-              <a:t>05.11.2022</a:t>
+              <a:t>06.11.2022</a:t>
             </a:fld>
             <a:endParaRPr lang="de-DE"/>
           </a:p>
@@ -1422,7 +1422,7 @@
           <a:p>
             <a:fld id="{187A1D98-78C0-4636-B978-80F082D40D27}" type="datetimeFigureOut">
               <a:rPr lang="de-DE" smtClean="0"/>
-              <a:t>05.11.2022</a:t>
+              <a:t>06.11.2022</a:t>
             </a:fld>
             <a:endParaRPr lang="de-DE"/>
           </a:p>
@@ -1849,7 +1849,7 @@
           <a:p>
             <a:fld id="{187A1D98-78C0-4636-B978-80F082D40D27}" type="datetimeFigureOut">
               <a:rPr lang="de-DE" smtClean="0"/>
-              <a:t>05.11.2022</a:t>
+              <a:t>06.11.2022</a:t>
             </a:fld>
             <a:endParaRPr lang="de-DE"/>
           </a:p>
@@ -1991,7 +1991,7 @@
           <a:p>
             <a:fld id="{187A1D98-78C0-4636-B978-80F082D40D27}" type="datetimeFigureOut">
               <a:rPr lang="de-DE" smtClean="0"/>
-              <a:t>05.11.2022</a:t>
+              <a:t>06.11.2022</a:t>
             </a:fld>
             <a:endParaRPr lang="de-DE"/>
           </a:p>
@@ -2104,7 +2104,7 @@
           <a:p>
             <a:fld id="{187A1D98-78C0-4636-B978-80F082D40D27}" type="datetimeFigureOut">
               <a:rPr lang="de-DE" smtClean="0"/>
-              <a:t>05.11.2022</a:t>
+              <a:t>06.11.2022</a:t>
             </a:fld>
             <a:endParaRPr lang="de-DE"/>
           </a:p>
@@ -2423,7 +2423,7 @@
           <a:p>
             <a:fld id="{187A1D98-78C0-4636-B978-80F082D40D27}" type="datetimeFigureOut">
               <a:rPr lang="de-DE" smtClean="0"/>
-              <a:t>05.11.2022</a:t>
+              <a:t>06.11.2022</a:t>
             </a:fld>
             <a:endParaRPr lang="de-DE"/>
           </a:p>
@@ -2718,7 +2718,7 @@
           <a:p>
             <a:fld id="{187A1D98-78C0-4636-B978-80F082D40D27}" type="datetimeFigureOut">
               <a:rPr lang="de-DE" smtClean="0"/>
-              <a:t>05.11.2022</a:t>
+              <a:t>06.11.2022</a:t>
             </a:fld>
             <a:endParaRPr lang="de-DE"/>
           </a:p>
@@ -2893,7 +2893,7 @@
           <a:p>
             <a:fld id="{187A1D98-78C0-4636-B978-80F082D40D27}" type="datetimeFigureOut">
               <a:rPr lang="de-DE" smtClean="0"/>
-              <a:t>05.11.2022</a:t>
+              <a:t>06.11.2022</a:t>
             </a:fld>
             <a:endParaRPr lang="de-DE"/>
           </a:p>
@@ -3508,7 +3508,7 @@
           </a:fontRef>
         </p:style>
         <p:txBody>
-          <a:bodyPr lIns="108000" rtlCol="0" anchor="ctr"/>
+          <a:bodyPr lIns="108000" tIns="50400" rtlCol="0" anchor="ctr"/>
           <a:lstStyle/>
           <a:p>
             <a:pPr algn="ctr"/>

</xml_diff>

<commit_message>
get paragraph indent level
</commit_message>
<xml_diff>
--- a/ShapeCrawler.Tests/Resource/autoshape/autoshape-case003.pptx
+++ b/ShapeCrawler.Tests/Resource/autoshape/autoshape-case003.pptx
@@ -190,7 +190,7 @@
           <a:p>
             <a:fld id="{187A1D98-78C0-4636-B978-80F082D40D27}" type="datetimeFigureOut">
               <a:rPr lang="de-DE" smtClean="0"/>
-              <a:t>07.11.2022</a:t>
+              <a:t>09.11.2022</a:t>
             </a:fld>
             <a:endParaRPr lang="de-DE"/>
           </a:p>
@@ -448,7 +448,7 @@
           <a:p>
             <a:fld id="{187A1D98-78C0-4636-B978-80F082D40D27}" type="datetimeFigureOut">
               <a:rPr lang="de-DE" smtClean="0"/>
-              <a:t>07.11.2022</a:t>
+              <a:t>09.11.2022</a:t>
             </a:fld>
             <a:endParaRPr lang="de-DE"/>
           </a:p>
@@ -661,7 +661,7 @@
           <a:p>
             <a:fld id="{187A1D98-78C0-4636-B978-80F082D40D27}" type="datetimeFigureOut">
               <a:rPr lang="de-DE" smtClean="0"/>
-              <a:t>07.11.2022</a:t>
+              <a:t>09.11.2022</a:t>
             </a:fld>
             <a:endParaRPr lang="de-DE"/>
           </a:p>
@@ -869,7 +869,7 @@
           <a:p>
             <a:fld id="{187A1D98-78C0-4636-B978-80F082D40D27}" type="datetimeFigureOut">
               <a:rPr lang="de-DE" smtClean="0"/>
-              <a:t>07.11.2022</a:t>
+              <a:t>09.11.2022</a:t>
             </a:fld>
             <a:endParaRPr lang="de-DE"/>
           </a:p>
@@ -1148,7 +1148,7 @@
           <a:p>
             <a:fld id="{187A1D98-78C0-4636-B978-80F082D40D27}" type="datetimeFigureOut">
               <a:rPr lang="de-DE" smtClean="0"/>
-              <a:t>07.11.2022</a:t>
+              <a:t>09.11.2022</a:t>
             </a:fld>
             <a:endParaRPr lang="de-DE"/>
           </a:p>
@@ -1422,7 +1422,7 @@
           <a:p>
             <a:fld id="{187A1D98-78C0-4636-B978-80F082D40D27}" type="datetimeFigureOut">
               <a:rPr lang="de-DE" smtClean="0"/>
-              <a:t>07.11.2022</a:t>
+              <a:t>09.11.2022</a:t>
             </a:fld>
             <a:endParaRPr lang="de-DE"/>
           </a:p>
@@ -1849,7 +1849,7 @@
           <a:p>
             <a:fld id="{187A1D98-78C0-4636-B978-80F082D40D27}" type="datetimeFigureOut">
               <a:rPr lang="de-DE" smtClean="0"/>
-              <a:t>07.11.2022</a:t>
+              <a:t>09.11.2022</a:t>
             </a:fld>
             <a:endParaRPr lang="de-DE"/>
           </a:p>
@@ -1991,7 +1991,7 @@
           <a:p>
             <a:fld id="{187A1D98-78C0-4636-B978-80F082D40D27}" type="datetimeFigureOut">
               <a:rPr lang="de-DE" smtClean="0"/>
-              <a:t>07.11.2022</a:t>
+              <a:t>09.11.2022</a:t>
             </a:fld>
             <a:endParaRPr lang="de-DE"/>
           </a:p>
@@ -2104,7 +2104,7 @@
           <a:p>
             <a:fld id="{187A1D98-78C0-4636-B978-80F082D40D27}" type="datetimeFigureOut">
               <a:rPr lang="de-DE" smtClean="0"/>
-              <a:t>07.11.2022</a:t>
+              <a:t>09.11.2022</a:t>
             </a:fld>
             <a:endParaRPr lang="de-DE"/>
           </a:p>
@@ -2423,7 +2423,7 @@
           <a:p>
             <a:fld id="{187A1D98-78C0-4636-B978-80F082D40D27}" type="datetimeFigureOut">
               <a:rPr lang="de-DE" smtClean="0"/>
-              <a:t>07.11.2022</a:t>
+              <a:t>09.11.2022</a:t>
             </a:fld>
             <a:endParaRPr lang="de-DE"/>
           </a:p>
@@ -2718,7 +2718,7 @@
           <a:p>
             <a:fld id="{187A1D98-78C0-4636-B978-80F082D40D27}" type="datetimeFigureOut">
               <a:rPr lang="de-DE" smtClean="0"/>
-              <a:t>07.11.2022</a:t>
+              <a:t>09.11.2022</a:t>
             </a:fld>
             <a:endParaRPr lang="de-DE"/>
           </a:p>
@@ -2893,7 +2893,7 @@
           <a:p>
             <a:fld id="{187A1D98-78C0-4636-B978-80F082D40D27}" type="datetimeFigureOut">
               <a:rPr lang="de-DE" smtClean="0"/>
-              <a:t>07.11.2022</a:t>
+              <a:t>09.11.2022</a:t>
             </a:fld>
             <a:endParaRPr lang="de-DE"/>
           </a:p>
@@ -3362,6 +3362,210 @@
       </p:grpSpPr>
       <p:sp>
         <p:nvSpPr>
+          <p:cNvPr id="6" name="AutoShape 5">
+            <a:extLst>
+              <a:ext uri="{FF2B5EF4-FFF2-40B4-BE49-F238E27FC236}">
+                <a16:creationId xmlns:a16="http://schemas.microsoft.com/office/drawing/2014/main" id="{FC3EBF4F-38A3-BA76-A3A4-CC4C596DF032}"/>
+              </a:ext>
+            </a:extLst>
+          </p:cNvPr>
+          <p:cNvSpPr/>
+          <p:nvPr/>
+        </p:nvSpPr>
+        <p:spPr>
+          <a:xfrm>
+            <a:off x="4106634" y="159201"/>
+            <a:ext cx="1574319" cy="571501"/>
+          </a:xfrm>
+          <a:prstGeom prst="rect">
+            <a:avLst/>
+          </a:prstGeom>
+          <a:noFill/>
+        </p:spPr>
+        <p:style>
+          <a:lnRef idx="2">
+            <a:schemeClr val="accent1">
+              <a:shade val="50000"/>
+            </a:schemeClr>
+          </a:lnRef>
+          <a:fillRef idx="1">
+            <a:schemeClr val="accent1"/>
+          </a:fillRef>
+          <a:effectRef idx="0">
+            <a:schemeClr val="accent1"/>
+          </a:effectRef>
+          <a:fontRef idx="minor">
+            <a:schemeClr val="lt1"/>
+          </a:fontRef>
+        </p:style>
+        <p:txBody>
+          <a:bodyPr lIns="108000" tIns="50400" rtlCol="0" anchor="ctr"/>
+          <a:lstStyle/>
+          <a:p>
+            <a:pPr marL="171450" indent="-171450">
+              <a:buFont typeface="Arial" panose="020B0604020202020204" pitchFamily="34" charset="0"/>
+              <a:buChar char="•"/>
+            </a:pPr>
+            <a:r>
+              <a:rPr lang="en-US" sz="1050" dirty="0">
+                <a:solidFill>
+                  <a:schemeClr val="tx1"/>
+                </a:solidFill>
+              </a:rPr>
+              <a:t>AutoShape 5</a:t>
+            </a:r>
+          </a:p>
+          <a:p>
+            <a:pPr marL="628650" lvl="1" indent="-171450">
+              <a:buFont typeface="Arial" panose="020B0604020202020204" pitchFamily="34" charset="0"/>
+              <a:buChar char="•"/>
+            </a:pPr>
+            <a:r>
+              <a:rPr lang="en-US" sz="1000" dirty="0">
+                <a:solidFill>
+                  <a:schemeClr val="tx1"/>
+                </a:solidFill>
+              </a:rPr>
+              <a:t>Some text</a:t>
+            </a:r>
+            <a:endParaRPr lang="de-DE" sz="900" dirty="0">
+              <a:solidFill>
+                <a:schemeClr val="tx1"/>
+              </a:solidFill>
+            </a:endParaRPr>
+          </a:p>
+        </p:txBody>
+      </p:sp>
+      <p:sp>
+        <p:nvSpPr>
+          <p:cNvPr id="3" name="AutoShape 4">
+            <a:extLst>
+              <a:ext uri="{FF2B5EF4-FFF2-40B4-BE49-F238E27FC236}">
+                <a16:creationId xmlns:a16="http://schemas.microsoft.com/office/drawing/2014/main" id="{A5FA7840-6F2F-A79C-886E-1C69F70F68F2}"/>
+              </a:ext>
+            </a:extLst>
+          </p:cNvPr>
+          <p:cNvSpPr/>
+          <p:nvPr/>
+        </p:nvSpPr>
+        <p:spPr>
+          <a:xfrm>
+            <a:off x="179614" y="1459244"/>
+            <a:ext cx="1098096" cy="261610"/>
+          </a:xfrm>
+          <a:prstGeom prst="rect">
+            <a:avLst/>
+          </a:prstGeom>
+          <a:noFill/>
+        </p:spPr>
+        <p:style>
+          <a:lnRef idx="2">
+            <a:schemeClr val="accent1">
+              <a:shade val="50000"/>
+            </a:schemeClr>
+          </a:lnRef>
+          <a:fillRef idx="1">
+            <a:schemeClr val="accent1"/>
+          </a:fillRef>
+          <a:effectRef idx="0">
+            <a:schemeClr val="accent1"/>
+          </a:effectRef>
+          <a:fontRef idx="minor">
+            <a:schemeClr val="lt1"/>
+          </a:fontRef>
+        </p:style>
+        <p:txBody>
+          <a:bodyPr rtlCol="0" anchor="ctr">
+            <a:spAutoFit/>
+          </a:bodyPr>
+          <a:lstStyle/>
+          <a:p>
+            <a:pPr algn="ctr"/>
+            <a:r>
+              <a:rPr lang="en-US" sz="1100" dirty="0">
+                <a:solidFill>
+                  <a:schemeClr val="tx1"/>
+                </a:solidFill>
+              </a:rPr>
+              <a:t>AutoShape 4</a:t>
+            </a:r>
+            <a:endParaRPr lang="de-DE" sz="1100" dirty="0">
+              <a:solidFill>
+                <a:schemeClr val="tx1"/>
+              </a:solidFill>
+            </a:endParaRPr>
+          </a:p>
+        </p:txBody>
+      </p:sp>
+      <p:sp>
+        <p:nvSpPr>
+          <p:cNvPr id="5" name="AutoShape 3">
+            <a:extLst>
+              <a:ext uri="{FF2B5EF4-FFF2-40B4-BE49-F238E27FC236}">
+                <a16:creationId xmlns:a16="http://schemas.microsoft.com/office/drawing/2014/main" id="{3E38D920-4C86-554B-0217-17B187DC0326}"/>
+              </a:ext>
+            </a:extLst>
+          </p:cNvPr>
+          <p:cNvSpPr/>
+          <p:nvPr/>
+        </p:nvSpPr>
+        <p:spPr>
+          <a:xfrm>
+            <a:off x="2837089" y="159201"/>
+            <a:ext cx="1098096" cy="571501"/>
+          </a:xfrm>
+          <a:prstGeom prst="rect">
+            <a:avLst/>
+          </a:prstGeom>
+          <a:noFill/>
+        </p:spPr>
+        <p:style>
+          <a:lnRef idx="2">
+            <a:schemeClr val="accent1">
+              <a:shade val="50000"/>
+            </a:schemeClr>
+          </a:lnRef>
+          <a:fillRef idx="1">
+            <a:schemeClr val="accent1"/>
+          </a:fillRef>
+          <a:effectRef idx="0">
+            <a:schemeClr val="accent1"/>
+          </a:effectRef>
+          <a:fontRef idx="minor">
+            <a:schemeClr val="lt1"/>
+          </a:fontRef>
+        </p:style>
+        <p:txBody>
+          <a:bodyPr lIns="108000" tIns="50400" rtlCol="0" anchor="ctr"/>
+          <a:lstStyle/>
+          <a:p>
+            <a:pPr algn="ctr"/>
+            <a:r>
+              <a:rPr lang="en-US" sz="1200" dirty="0">
+                <a:solidFill>
+                  <a:schemeClr val="tx1"/>
+                </a:solidFill>
+              </a:rPr>
+              <a:t>Some</a:t>
+            </a:r>
+            <a:r>
+              <a:rPr lang="en-US" sz="1100" dirty="0">
+                <a:solidFill>
+                  <a:schemeClr val="tx1"/>
+                </a:solidFill>
+              </a:rPr>
+              <a:t> text</a:t>
+            </a:r>
+            <a:endParaRPr lang="de-DE" sz="1100" dirty="0">
+              <a:solidFill>
+                <a:schemeClr val="tx1"/>
+              </a:solidFill>
+            </a:endParaRPr>
+          </a:p>
+        </p:txBody>
+      </p:sp>
+      <p:sp>
+        <p:nvSpPr>
           <p:cNvPr id="2" name="AutoShape 2">
             <a:extLst>
               <a:ext uri="{FF2B5EF4-FFF2-40B4-BE49-F238E27FC236}">
@@ -3466,134 +3670,6 @@
               <a:t>AutoShape 1</a:t>
             </a:r>
             <a:endParaRPr lang="de-DE" sz="1200" dirty="0"/>
-          </a:p>
-        </p:txBody>
-      </p:sp>
-      <p:sp>
-        <p:nvSpPr>
-          <p:cNvPr id="5" name="AutoShape 3">
-            <a:extLst>
-              <a:ext uri="{FF2B5EF4-FFF2-40B4-BE49-F238E27FC236}">
-                <a16:creationId xmlns:a16="http://schemas.microsoft.com/office/drawing/2014/main" id="{3E38D920-4C86-554B-0217-17B187DC0326}"/>
-              </a:ext>
-            </a:extLst>
-          </p:cNvPr>
-          <p:cNvSpPr/>
-          <p:nvPr/>
-        </p:nvSpPr>
-        <p:spPr>
-          <a:xfrm>
-            <a:off x="2837089" y="159201"/>
-            <a:ext cx="1098096" cy="571501"/>
-          </a:xfrm>
-          <a:prstGeom prst="rect">
-            <a:avLst/>
-          </a:prstGeom>
-          <a:noFill/>
-        </p:spPr>
-        <p:style>
-          <a:lnRef idx="2">
-            <a:schemeClr val="accent1">
-              <a:shade val="50000"/>
-            </a:schemeClr>
-          </a:lnRef>
-          <a:fillRef idx="1">
-            <a:schemeClr val="accent1"/>
-          </a:fillRef>
-          <a:effectRef idx="0">
-            <a:schemeClr val="accent1"/>
-          </a:effectRef>
-          <a:fontRef idx="minor">
-            <a:schemeClr val="lt1"/>
-          </a:fontRef>
-        </p:style>
-        <p:txBody>
-          <a:bodyPr lIns="108000" tIns="50400" rtlCol="0" anchor="ctr"/>
-          <a:lstStyle/>
-          <a:p>
-            <a:pPr algn="ctr"/>
-            <a:r>
-              <a:rPr lang="en-US" sz="1200" dirty="0">
-                <a:solidFill>
-                  <a:schemeClr val="tx1"/>
-                </a:solidFill>
-              </a:rPr>
-              <a:t>Some</a:t>
-            </a:r>
-            <a:r>
-              <a:rPr lang="en-US" sz="1100" dirty="0">
-                <a:solidFill>
-                  <a:schemeClr val="tx1"/>
-                </a:solidFill>
-              </a:rPr>
-              <a:t> text</a:t>
-            </a:r>
-            <a:endParaRPr lang="de-DE" sz="1100" dirty="0">
-              <a:solidFill>
-                <a:schemeClr val="tx1"/>
-              </a:solidFill>
-            </a:endParaRPr>
-          </a:p>
-        </p:txBody>
-      </p:sp>
-      <p:sp>
-        <p:nvSpPr>
-          <p:cNvPr id="3" name="AutoShape 4">
-            <a:extLst>
-              <a:ext uri="{FF2B5EF4-FFF2-40B4-BE49-F238E27FC236}">
-                <a16:creationId xmlns:a16="http://schemas.microsoft.com/office/drawing/2014/main" id="{A5FA7840-6F2F-A79C-886E-1C69F70F68F2}"/>
-              </a:ext>
-            </a:extLst>
-          </p:cNvPr>
-          <p:cNvSpPr/>
-          <p:nvPr/>
-        </p:nvSpPr>
-        <p:spPr>
-          <a:xfrm>
-            <a:off x="179614" y="1459244"/>
-            <a:ext cx="1098096" cy="261610"/>
-          </a:xfrm>
-          <a:prstGeom prst="rect">
-            <a:avLst/>
-          </a:prstGeom>
-          <a:noFill/>
-        </p:spPr>
-        <p:style>
-          <a:lnRef idx="2">
-            <a:schemeClr val="accent1">
-              <a:shade val="50000"/>
-            </a:schemeClr>
-          </a:lnRef>
-          <a:fillRef idx="1">
-            <a:schemeClr val="accent1"/>
-          </a:fillRef>
-          <a:effectRef idx="0">
-            <a:schemeClr val="accent1"/>
-          </a:effectRef>
-          <a:fontRef idx="minor">
-            <a:schemeClr val="lt1"/>
-          </a:fontRef>
-        </p:style>
-        <p:txBody>
-          <a:bodyPr rtlCol="0" anchor="ctr">
-            <a:spAutoFit/>
-          </a:bodyPr>
-          <a:lstStyle/>
-          <a:p>
-            <a:pPr algn="ctr"/>
-            <a:r>
-              <a:rPr lang="en-US" sz="1100" dirty="0">
-                <a:solidFill>
-                  <a:schemeClr val="tx1"/>
-                </a:solidFill>
-              </a:rPr>
-              <a:t>AutoShape 4</a:t>
-            </a:r>
-            <a:endParaRPr lang="de-DE" sz="1100" dirty="0">
-              <a:solidFill>
-                <a:schemeClr val="tx1"/>
-              </a:solidFill>
-            </a:endParaRPr>
           </a:p>
         </p:txBody>
       </p:sp>

</xml_diff>